<commit_message>
github link to presentation
</commit_message>
<xml_diff>
--- a/A - Scope/Presentation in-bid-win.pptx
+++ b/A - Scope/Presentation in-bid-win.pptx
@@ -105,6 +105,11 @@
       </a:defRPr>
     </a:lvl9pPr>
   </p:defaultTextStyle>
+  <p:extLst>
+    <p:ext uri="{EFAFB233-063F-42B5-8137-9DF3F51BA10A}">
+      <p15:sldGuideLst xmlns:p15="http://schemas.microsoft.com/office/powerpoint/2012/main"/>
+    </p:ext>
+  </p:extLst>
 </p:presentation>
 </file>
 
@@ -3415,7 +3420,7 @@
         </p:spPr>
         <p:txBody>
           <a:bodyPr anchor="t">
-            <a:normAutofit/>
+            <a:normAutofit fontScale="92500" lnSpcReduction="20000"/>
           </a:bodyPr>
           <a:lstStyle/>
           <a:p>
@@ -3477,6 +3482,15 @@
             <a:r>
               <a:rPr lang="en-US" sz="1600" dirty="0"/>
               <a:t>George Lardas</a:t>
+            </a:r>
+          </a:p>
+          <a:p>
+            <a:pPr algn="l"/>
+            <a:r>
+              <a:rPr lang="en-US" sz="1600" dirty="0">
+                <a:hlinkClick r:id="rId2"/>
+              </a:rPr>
+              <a:t>https://github.com/harivdee/in-bid-win</a:t>
             </a:r>
             <a:endParaRPr lang="el-GR" sz="1600" dirty="0"/>
           </a:p>
@@ -3664,7 +3678,7 @@
           <p:nvPr/>
         </p:nvPicPr>
         <p:blipFill rotWithShape="1">
-          <a:blip r:embed="rId2">
+          <a:blip r:embed="rId3">
             <a:extLst>
               <a:ext uri="{28A0092B-C50C-407E-A947-70E740481C1C}">
                 <a14:useLocalDpi xmlns:a14="http://schemas.microsoft.com/office/drawing/2010/main" val="0"/>
@@ -3923,7 +3937,15 @@
           <a:p>
             <a:r>
               <a:rPr lang="en-US" dirty="0"/>
-              <a:t>A platform for selling and buying and apartments via a custom auction and bid system.</a:t>
+              <a:t>A platform for leasing </a:t>
+            </a:r>
+            <a:r>
+              <a:rPr lang="en-US"/>
+              <a:t>and renting </a:t>
+            </a:r>
+            <a:r>
+              <a:rPr lang="en-US" dirty="0"/>
+              <a:t>and apartments via a custom auction and bid system.</a:t>
             </a:r>
             <a:endParaRPr lang="el-GR" dirty="0"/>
           </a:p>

</xml_diff>